<commit_message>
Mod 11 updates complete
</commit_message>
<xml_diff>
--- a/Modules/11-Chef_Intermediate.pptx
+++ b/Modules/11-Chef_Intermediate.pptx
@@ -273,7 +273,7 @@
           <a:p>
             <a:fld id="{1D8BD707-D9CF-40AE-B4C6-C98DA3205C09}" type="datetimeFigureOut">
               <a:rPr lang="en-US"/>
-              <a:t>6/5/2015</a:t>
+              <a:t>6/29/2015</a:t>
             </a:fld>
             <a:endParaRPr lang="en-US"/>
           </a:p>
@@ -456,7 +456,7 @@
           <a:p>
             <a:fld id="{1D8BD707-D9CF-40AE-B4C6-C98DA3205C09}" type="datetimeFigureOut">
               <a:rPr lang="en-US"/>
-              <a:t>6/5/2015</a:t>
+              <a:t>6/29/2015</a:t>
             </a:fld>
             <a:endParaRPr lang="en-US"/>
           </a:p>
@@ -3701,7 +3701,7 @@
           <a:p>
             <a:fld id="{1D8BD707-D9CF-40AE-B4C6-C98DA3205C09}" type="datetimeFigureOut">
               <a:rPr lang="en-US"/>
-              <a:t>6/5/2015</a:t>
+              <a:t>6/29/2015</a:t>
             </a:fld>
             <a:endParaRPr lang="en-US"/>
           </a:p>
@@ -3855,7 +3855,7 @@
           <a:p>
             <a:fld id="{1D8BD707-D9CF-40AE-B4C6-C98DA3205C09}" type="datetimeFigureOut">
               <a:rPr lang="en-US"/>
-              <a:t>6/5/2015</a:t>
+              <a:t>6/29/2015</a:t>
             </a:fld>
             <a:endParaRPr lang="en-US"/>
           </a:p>
@@ -7028,7 +7028,7 @@
           <a:p>
             <a:fld id="{1D8BD707-D9CF-40AE-B4C6-C98DA3205C09}" type="datetimeFigureOut">
               <a:rPr lang="en-US"/>
-              <a:t>6/5/2015</a:t>
+              <a:t>6/29/2015</a:t>
             </a:fld>
             <a:endParaRPr lang="en-US"/>
           </a:p>
@@ -7309,7 +7309,7 @@
           <a:p>
             <a:fld id="{1D8BD707-D9CF-40AE-B4C6-C98DA3205C09}" type="datetimeFigureOut">
               <a:rPr lang="en-US"/>
-              <a:t>6/5/2015</a:t>
+              <a:t>6/29/2015</a:t>
             </a:fld>
             <a:endParaRPr lang="en-US"/>
           </a:p>

</xml_diff>